<commit_message>
Update FMCAD and Practicum
</commit_message>
<xml_diff>
--- a/statics/slides/2023-Fall-Practicum Talk 2.pptx
+++ b/statics/slides/2023-Fall-Practicum Talk 2.pptx
@@ -17895,7 +17895,7 @@
           <a:p>
             <a:fld id="{106FE443-74C4-499B-B94E-38139690B594}" type="datetimeFigureOut">
               <a:rPr lang="zh-CN" altLang="en-US" smtClean="0"/>
-              <a:t>2023/10/10</a:t>
+              <a:t>2023/10/27</a:t>
             </a:fld>
             <a:endParaRPr lang="zh-CN" altLang="en-US"/>
           </a:p>
@@ -20112,7 +20112,7 @@
           <a:p>
             <a:fld id="{E72028D4-BDA7-48F1-97BA-5449C377C1F7}" type="datetime1">
               <a:rPr lang="zh-CN" altLang="en-US" smtClean="0"/>
-              <a:t>2023/10/10</a:t>
+              <a:t>2023/10/27</a:t>
             </a:fld>
             <a:endParaRPr lang="zh-CN" altLang="en-US"/>
           </a:p>
@@ -20310,7 +20310,7 @@
           <a:p>
             <a:fld id="{E38F565A-8440-471E-8848-814D992211A1}" type="datetime1">
               <a:rPr lang="zh-CN" altLang="en-US" smtClean="0"/>
-              <a:t>2023/10/10</a:t>
+              <a:t>2023/10/27</a:t>
             </a:fld>
             <a:endParaRPr lang="zh-CN" altLang="en-US"/>
           </a:p>
@@ -20518,7 +20518,7 @@
           <a:p>
             <a:fld id="{9CC89AAA-C284-49AE-87F3-513C91A46E86}" type="datetime1">
               <a:rPr lang="zh-CN" altLang="en-US" smtClean="0"/>
-              <a:t>2023/10/10</a:t>
+              <a:t>2023/10/27</a:t>
             </a:fld>
             <a:endParaRPr lang="zh-CN" altLang="en-US"/>
           </a:p>
@@ -20716,7 +20716,7 @@
           <a:p>
             <a:fld id="{CF682199-90A7-47A3-ACA4-94ABDAEA65D2}" type="datetime1">
               <a:rPr lang="zh-CN" altLang="en-US" smtClean="0"/>
-              <a:t>2023/10/10</a:t>
+              <a:t>2023/10/27</a:t>
             </a:fld>
             <a:endParaRPr lang="zh-CN" altLang="en-US"/>
           </a:p>
@@ -20991,7 +20991,7 @@
           <a:p>
             <a:fld id="{57B4A720-9266-4F21-B1D5-A546C6B171E2}" type="datetime1">
               <a:rPr lang="zh-CN" altLang="en-US" smtClean="0"/>
-              <a:t>2023/10/10</a:t>
+              <a:t>2023/10/27</a:t>
             </a:fld>
             <a:endParaRPr lang="zh-CN" altLang="en-US"/>
           </a:p>
@@ -21256,7 +21256,7 @@
           <a:p>
             <a:fld id="{A3A2F5F4-D417-4F90-8628-3D209E28D6E7}" type="datetime1">
               <a:rPr lang="zh-CN" altLang="en-US" smtClean="0"/>
-              <a:t>2023/10/10</a:t>
+              <a:t>2023/10/27</a:t>
             </a:fld>
             <a:endParaRPr lang="zh-CN" altLang="en-US"/>
           </a:p>
@@ -21668,7 +21668,7 @@
           <a:p>
             <a:fld id="{8D9761D2-4B29-4C41-A866-55E3457D1F34}" type="datetime1">
               <a:rPr lang="zh-CN" altLang="en-US" smtClean="0"/>
-              <a:t>2023/10/10</a:t>
+              <a:t>2023/10/27</a:t>
             </a:fld>
             <a:endParaRPr lang="zh-CN" altLang="en-US"/>
           </a:p>
@@ -21809,7 +21809,7 @@
           <a:p>
             <a:fld id="{AC7DDA61-DECA-4E13-8DD1-21A894F56E1C}" type="datetime1">
               <a:rPr lang="zh-CN" altLang="en-US" smtClean="0"/>
-              <a:t>2023/10/10</a:t>
+              <a:t>2023/10/27</a:t>
             </a:fld>
             <a:endParaRPr lang="zh-CN" altLang="en-US"/>
           </a:p>
@@ -21922,7 +21922,7 @@
           <a:p>
             <a:fld id="{0DBFB9FA-2AB9-4F99-86A7-BB6208662C5A}" type="datetime1">
               <a:rPr lang="zh-CN" altLang="en-US" smtClean="0"/>
-              <a:t>2023/10/10</a:t>
+              <a:t>2023/10/27</a:t>
             </a:fld>
             <a:endParaRPr lang="zh-CN" altLang="en-US"/>
           </a:p>
@@ -22233,7 +22233,7 @@
           <a:p>
             <a:fld id="{856EBE9C-F7E3-4BBF-980C-FE671B31260E}" type="datetime1">
               <a:rPr lang="zh-CN" altLang="en-US" smtClean="0"/>
-              <a:t>2023/10/10</a:t>
+              <a:t>2023/10/27</a:t>
             </a:fld>
             <a:endParaRPr lang="zh-CN" altLang="en-US"/>
           </a:p>
@@ -22521,7 +22521,7 @@
           <a:p>
             <a:fld id="{9BEAA614-C2FC-4E03-A9B7-1CC8EB72169B}" type="datetime1">
               <a:rPr lang="zh-CN" altLang="en-US" smtClean="0"/>
-              <a:t>2023/10/10</a:t>
+              <a:t>2023/10/27</a:t>
             </a:fld>
             <a:endParaRPr lang="zh-CN" altLang="en-US"/>
           </a:p>
@@ -22762,7 +22762,7 @@
           <a:p>
             <a:fld id="{0BE153CE-BD76-4431-90A5-9AC664E7DF69}" type="datetime1">
               <a:rPr lang="zh-CN" altLang="en-US" smtClean="0"/>
-              <a:t>2023/10/10</a:t>
+              <a:t>2023/10/27</a:t>
             </a:fld>
             <a:endParaRPr lang="zh-CN" altLang="en-US"/>
           </a:p>
@@ -25826,27 +25826,6 @@
             </a:pPr>
             <a:r>
               <a:rPr lang="en-US" altLang="zh-CN" dirty="0"/>
-              <a:t>A well-defined process can help improve software quality, but sometimes a burden to developers.</a:t>
-            </a:r>
-          </a:p>
-          <a:p>
-            <a:pPr marL="0" indent="0">
-              <a:spcBef>
-                <a:spcPts val="600"/>
-              </a:spcBef>
-              <a:buNone/>
-            </a:pPr>
-            <a:endParaRPr lang="en-US" altLang="zh-CN" dirty="0"/>
-          </a:p>
-          <a:p>
-            <a:pPr marL="0" indent="0">
-              <a:spcBef>
-                <a:spcPts val="600"/>
-              </a:spcBef>
-              <a:buNone/>
-            </a:pPr>
-            <a:r>
-              <a:rPr lang="en-US" altLang="zh-CN" dirty="0"/>
               <a:t>Will good design and documentation relief engineers from tedious coding tasks in the AI era?</a:t>
             </a:r>
           </a:p>
@@ -26289,6 +26268,221 @@
   <p:clrMapOvr>
     <a:masterClrMapping/>
   </p:clrMapOvr>
+  <p:timing>
+    <p:tnLst>
+      <p:par>
+        <p:cTn id="1" dur="indefinite" restart="never" nodeType="tmRoot">
+          <p:childTnLst>
+            <p:seq concurrent="1" nextAc="seek">
+              <p:cTn id="2" dur="indefinite" nodeType="mainSeq">
+                <p:childTnLst>
+                  <p:par>
+                    <p:cTn id="3" fill="hold">
+                      <p:stCondLst>
+                        <p:cond delay="indefinite"/>
+                      </p:stCondLst>
+                      <p:childTnLst>
+                        <p:par>
+                          <p:cTn id="4" fill="hold">
+                            <p:stCondLst>
+                              <p:cond delay="0"/>
+                            </p:stCondLst>
+                            <p:childTnLst>
+                              <p:par>
+                                <p:cTn id="5" presetID="1" presetClass="entr" presetSubtype="0" fill="hold" grpId="0" nodeType="clickEffect">
+                                  <p:stCondLst>
+                                    <p:cond delay="0"/>
+                                  </p:stCondLst>
+                                  <p:childTnLst>
+                                    <p:set>
+                                      <p:cBhvr>
+                                        <p:cTn id="6" dur="1" fill="hold">
+                                          <p:stCondLst>
+                                            <p:cond delay="0"/>
+                                          </p:stCondLst>
+                                        </p:cTn>
+                                        <p:tgtEl>
+                                          <p:spTgt spid="6"/>
+                                        </p:tgtEl>
+                                        <p:attrNameLst>
+                                          <p:attrName>style.visibility</p:attrName>
+                                        </p:attrNameLst>
+                                      </p:cBhvr>
+                                      <p:to>
+                                        <p:strVal val="visible"/>
+                                      </p:to>
+                                    </p:set>
+                                  </p:childTnLst>
+                                </p:cTn>
+                              </p:par>
+                            </p:childTnLst>
+                          </p:cTn>
+                        </p:par>
+                      </p:childTnLst>
+                    </p:cTn>
+                  </p:par>
+                  <p:par>
+                    <p:cTn id="7" fill="hold">
+                      <p:stCondLst>
+                        <p:cond delay="indefinite"/>
+                      </p:stCondLst>
+                      <p:childTnLst>
+                        <p:par>
+                          <p:cTn id="8" fill="hold">
+                            <p:stCondLst>
+                              <p:cond delay="0"/>
+                            </p:stCondLst>
+                            <p:childTnLst>
+                              <p:par>
+                                <p:cTn id="9" presetID="1" presetClass="entr" presetSubtype="0" fill="hold" grpId="0" nodeType="clickEffect">
+                                  <p:stCondLst>
+                                    <p:cond delay="0"/>
+                                  </p:stCondLst>
+                                  <p:childTnLst>
+                                    <p:set>
+                                      <p:cBhvr>
+                                        <p:cTn id="10" dur="1" fill="hold">
+                                          <p:stCondLst>
+                                            <p:cond delay="0"/>
+                                          </p:stCondLst>
+                                        </p:cTn>
+                                        <p:tgtEl>
+                                          <p:spTgt spid="7"/>
+                                        </p:tgtEl>
+                                        <p:attrNameLst>
+                                          <p:attrName>style.visibility</p:attrName>
+                                        </p:attrNameLst>
+                                      </p:cBhvr>
+                                      <p:to>
+                                        <p:strVal val="visible"/>
+                                      </p:to>
+                                    </p:set>
+                                  </p:childTnLst>
+                                </p:cTn>
+                              </p:par>
+                            </p:childTnLst>
+                          </p:cTn>
+                        </p:par>
+                      </p:childTnLst>
+                    </p:cTn>
+                  </p:par>
+                  <p:par>
+                    <p:cTn id="11" fill="hold">
+                      <p:stCondLst>
+                        <p:cond delay="indefinite"/>
+                      </p:stCondLst>
+                      <p:childTnLst>
+                        <p:par>
+                          <p:cTn id="12" fill="hold">
+                            <p:stCondLst>
+                              <p:cond delay="0"/>
+                            </p:stCondLst>
+                            <p:childTnLst>
+                              <p:par>
+                                <p:cTn id="13" presetID="1" presetClass="entr" presetSubtype="0" fill="hold" nodeType="clickEffect">
+                                  <p:stCondLst>
+                                    <p:cond delay="0"/>
+                                  </p:stCondLst>
+                                  <p:childTnLst>
+                                    <p:set>
+                                      <p:cBhvr>
+                                        <p:cTn id="14" dur="1" fill="hold">
+                                          <p:stCondLst>
+                                            <p:cond delay="0"/>
+                                          </p:stCondLst>
+                                        </p:cTn>
+                                        <p:tgtEl>
+                                          <p:spTgt spid="10"/>
+                                        </p:tgtEl>
+                                        <p:attrNameLst>
+                                          <p:attrName>style.visibility</p:attrName>
+                                        </p:attrNameLst>
+                                      </p:cBhvr>
+                                      <p:to>
+                                        <p:strVal val="visible"/>
+                                      </p:to>
+                                    </p:set>
+                                  </p:childTnLst>
+                                </p:cTn>
+                              </p:par>
+                            </p:childTnLst>
+                          </p:cTn>
+                        </p:par>
+                      </p:childTnLst>
+                    </p:cTn>
+                  </p:par>
+                  <p:par>
+                    <p:cTn id="15" fill="hold">
+                      <p:stCondLst>
+                        <p:cond delay="indefinite"/>
+                      </p:stCondLst>
+                      <p:childTnLst>
+                        <p:par>
+                          <p:cTn id="16" fill="hold">
+                            <p:stCondLst>
+                              <p:cond delay="0"/>
+                            </p:stCondLst>
+                            <p:childTnLst>
+                              <p:par>
+                                <p:cTn id="17" presetID="1" presetClass="entr" presetSubtype="0" fill="hold" grpId="0" nodeType="clickEffect">
+                                  <p:stCondLst>
+                                    <p:cond delay="0"/>
+                                  </p:stCondLst>
+                                  <p:childTnLst>
+                                    <p:set>
+                                      <p:cBhvr>
+                                        <p:cTn id="18" dur="1" fill="hold">
+                                          <p:stCondLst>
+                                            <p:cond delay="0"/>
+                                          </p:stCondLst>
+                                        </p:cTn>
+                                        <p:tgtEl>
+                                          <p:spTgt spid="12"/>
+                                        </p:tgtEl>
+                                        <p:attrNameLst>
+                                          <p:attrName>style.visibility</p:attrName>
+                                        </p:attrNameLst>
+                                      </p:cBhvr>
+                                      <p:to>
+                                        <p:strVal val="visible"/>
+                                      </p:to>
+                                    </p:set>
+                                  </p:childTnLst>
+                                </p:cTn>
+                              </p:par>
+                            </p:childTnLst>
+                          </p:cTn>
+                        </p:par>
+                      </p:childTnLst>
+                    </p:cTn>
+                  </p:par>
+                </p:childTnLst>
+              </p:cTn>
+              <p:prevCondLst>
+                <p:cond evt="onPrev" delay="0">
+                  <p:tgtEl>
+                    <p:sldTgt/>
+                  </p:tgtEl>
+                </p:cond>
+              </p:prevCondLst>
+              <p:nextCondLst>
+                <p:cond evt="onNext" delay="0">
+                  <p:tgtEl>
+                    <p:sldTgt/>
+                  </p:tgtEl>
+                </p:cond>
+              </p:nextCondLst>
+            </p:seq>
+          </p:childTnLst>
+        </p:cTn>
+      </p:par>
+    </p:tnLst>
+    <p:bldLst>
+      <p:bldP spid="6" grpId="0" animBg="1"/>
+      <p:bldP spid="7" grpId="0" animBg="1"/>
+      <p:bldP spid="12" grpId="0" animBg="1"/>
+    </p:bldLst>
+  </p:timing>
 </p:sld>
 </file>
 
@@ -31172,7 +31366,7 @@
         </p:nvSpPr>
         <p:spPr>
           <a:xfrm>
-            <a:off x="1727088" y="4628640"/>
+            <a:off x="1044514" y="4628639"/>
             <a:ext cx="1391480" cy="824948"/>
           </a:xfrm>
           <a:prstGeom prst="roundRect">
@@ -31437,8 +31631,8 @@
         </p:nvCxnSpPr>
         <p:spPr>
           <a:xfrm rot="10800000" flipV="1">
-            <a:off x="2422828" y="4023518"/>
-            <a:ext cx="2023938" cy="605121"/>
+            <a:off x="1740254" y="4023519"/>
+            <a:ext cx="2706512" cy="605120"/>
           </a:xfrm>
           <a:prstGeom prst="bentConnector2">
             <a:avLst/>
@@ -31720,6 +31914,145 @@
           </a:xfrm>
           <a:prstGeom prst="straightConnector1">
             <a:avLst/>
+          </a:prstGeom>
+          <a:ln w="12700">
+            <a:tailEnd type="triangle"/>
+          </a:ln>
+        </p:spPr>
+        <p:style>
+          <a:lnRef idx="1">
+            <a:schemeClr val="dk1"/>
+          </a:lnRef>
+          <a:fillRef idx="0">
+            <a:schemeClr val="dk1"/>
+          </a:fillRef>
+          <a:effectRef idx="0">
+            <a:schemeClr val="dk1"/>
+          </a:effectRef>
+          <a:fontRef idx="minor">
+            <a:schemeClr val="tx1"/>
+          </a:fontRef>
+        </p:style>
+      </p:cxnSp>
+      <p:grpSp>
+        <p:nvGrpSpPr>
+          <p:cNvPr id="3" name="组合 38">
+            <a:extLst>
+              <a:ext uri="{FF2B5EF4-FFF2-40B4-BE49-F238E27FC236}">
+                <a16:creationId xmlns:a16="http://schemas.microsoft.com/office/drawing/2014/main" id="{EE55B193-BA37-DD89-9CBF-DCD472BA33ED}"/>
+              </a:ext>
+            </a:extLst>
+          </p:cNvPr>
+          <p:cNvGrpSpPr/>
+          <p:nvPr/>
+        </p:nvGrpSpPr>
+        <p:grpSpPr>
+          <a:xfrm>
+            <a:off x="2675788" y="4491947"/>
+            <a:ext cx="1198657" cy="1247479"/>
+            <a:chOff x="8672887" y="2078274"/>
+            <a:chExt cx="1198657" cy="1247479"/>
+          </a:xfrm>
+        </p:grpSpPr>
+        <p:pic>
+          <p:nvPicPr>
+            <p:cNvPr id="5" name="图形 39" descr="数据库 轮廓">
+              <a:extLst>
+                <a:ext uri="{FF2B5EF4-FFF2-40B4-BE49-F238E27FC236}">
+                  <a16:creationId xmlns:a16="http://schemas.microsoft.com/office/drawing/2014/main" id="{CF1AFFD5-2B69-8094-D4C8-9B72F73E846E}"/>
+                </a:ext>
+              </a:extLst>
+            </p:cNvPr>
+            <p:cNvPicPr>
+              <a:picLocks noChangeAspect="1"/>
+            </p:cNvPicPr>
+            <p:nvPr/>
+          </p:nvPicPr>
+          <p:blipFill>
+            <a:blip r:embed="rId5">
+              <a:extLst>
+                <a:ext uri="{28A0092B-C50C-407E-A947-70E740481C1C}">
+                  <a14:useLocalDpi xmlns:a14="http://schemas.microsoft.com/office/drawing/2010/main" val="0"/>
+                </a:ext>
+                <a:ext uri="{96DAC541-7B7A-43D3-8B79-37D633B846F1}">
+                  <asvg:svgBlip xmlns:asvg="http://schemas.microsoft.com/office/drawing/2016/SVG/main" r:embed="rId6"/>
+                </a:ext>
+              </a:extLst>
+            </a:blip>
+            <a:stretch>
+              <a:fillRect/>
+            </a:stretch>
+          </p:blipFill>
+          <p:spPr>
+            <a:xfrm>
+              <a:off x="8815015" y="2078274"/>
+              <a:ext cx="914400" cy="914400"/>
+            </a:xfrm>
+            <a:prstGeom prst="rect">
+              <a:avLst/>
+            </a:prstGeom>
+          </p:spPr>
+        </p:pic>
+        <p:sp>
+          <p:nvSpPr>
+            <p:cNvPr id="14" name="文本框 40">
+              <a:extLst>
+                <a:ext uri="{FF2B5EF4-FFF2-40B4-BE49-F238E27FC236}">
+                  <a16:creationId xmlns:a16="http://schemas.microsoft.com/office/drawing/2014/main" id="{B685D158-C150-04B2-0764-C55EDE743CC7}"/>
+                </a:ext>
+              </a:extLst>
+            </p:cNvPr>
+            <p:cNvSpPr txBox="1"/>
+            <p:nvPr/>
+          </p:nvSpPr>
+          <p:spPr>
+            <a:xfrm>
+              <a:off x="8672887" y="2987199"/>
+              <a:ext cx="1198657" cy="338554"/>
+            </a:xfrm>
+            <a:prstGeom prst="rect">
+              <a:avLst/>
+            </a:prstGeom>
+            <a:noFill/>
+          </p:spPr>
+          <p:txBody>
+            <a:bodyPr wrap="square" rtlCol="0">
+              <a:spAutoFit/>
+            </a:bodyPr>
+            <a:lstStyle/>
+            <a:p>
+              <a:r>
+                <a:rPr lang="en-US" altLang="zh-CN" sz="1600" dirty="0"/>
+                <a:t>DynamoDB</a:t>
+              </a:r>
+              <a:endParaRPr lang="zh-CN" altLang="en-US" sz="1600" dirty="0"/>
+            </a:p>
+          </p:txBody>
+        </p:sp>
+      </p:grpSp>
+      <p:cxnSp>
+        <p:nvCxnSpPr>
+          <p:cNvPr id="18" name="连接符: 肘形 29">
+            <a:extLst>
+              <a:ext uri="{FF2B5EF4-FFF2-40B4-BE49-F238E27FC236}">
+                <a16:creationId xmlns:a16="http://schemas.microsoft.com/office/drawing/2014/main" id="{E59AFCA6-6972-9E7E-0B5E-A11405D57D63}"/>
+              </a:ext>
+            </a:extLst>
+          </p:cNvPr>
+          <p:cNvCxnSpPr>
+            <a:cxnSpLocks/>
+          </p:cNvCxnSpPr>
+          <p:nvPr/>
+        </p:nvCxnSpPr>
+        <p:spPr>
+          <a:xfrm flipV="1">
+            <a:off x="3614154" y="4447619"/>
+            <a:ext cx="1119806" cy="512396"/>
+          </a:xfrm>
+          <a:prstGeom prst="bentConnector3">
+            <a:avLst>
+              <a:gd name="adj1" fmla="val 99980"/>
+            </a:avLst>
           </a:prstGeom>
           <a:ln w="12700">
             <a:tailEnd type="triangle"/>
@@ -33886,7 +34219,7 @@
                                         <p:tgtEl>
                                           <p:spTgt spid="6">
                                             <p:txEl>
-                                              <p:pRg st="4" end="4"/>
+                                              <p:pRg st="1" end="1"/>
                                             </p:txEl>
                                           </p:spTgt>
                                         </p:tgtEl>
@@ -33917,7 +34250,7 @@
                                         <p:tgtEl>
                                           <p:spTgt spid="6">
                                             <p:txEl>
-                                              <p:pRg st="5" end="5"/>
+                                              <p:pRg st="2" end="2"/>
                                             </p:txEl>
                                           </p:spTgt>
                                         </p:tgtEl>
@@ -33948,6 +34281,117 @@
                                         <p:tgtEl>
                                           <p:spTgt spid="6">
                                             <p:txEl>
+                                              <p:pRg st="3" end="3"/>
+                                            </p:txEl>
+                                          </p:spTgt>
+                                        </p:tgtEl>
+                                        <p:attrNameLst>
+                                          <p:attrName>style.visibility</p:attrName>
+                                        </p:attrNameLst>
+                                      </p:cBhvr>
+                                      <p:to>
+                                        <p:strVal val="visible"/>
+                                      </p:to>
+                                    </p:set>
+                                  </p:childTnLst>
+                                </p:cTn>
+                              </p:par>
+                            </p:childTnLst>
+                          </p:cTn>
+                        </p:par>
+                      </p:childTnLst>
+                    </p:cTn>
+                  </p:par>
+                  <p:par>
+                    <p:cTn id="11" fill="hold">
+                      <p:stCondLst>
+                        <p:cond delay="indefinite"/>
+                      </p:stCondLst>
+                      <p:childTnLst>
+                        <p:par>
+                          <p:cTn id="12" fill="hold">
+                            <p:stCondLst>
+                              <p:cond delay="0"/>
+                            </p:stCondLst>
+                            <p:childTnLst>
+                              <p:par>
+                                <p:cTn id="13" presetID="1" presetClass="entr" presetSubtype="0" fill="hold" nodeType="clickEffect">
+                                  <p:stCondLst>
+                                    <p:cond delay="0"/>
+                                  </p:stCondLst>
+                                  <p:childTnLst>
+                                    <p:set>
+                                      <p:cBhvr>
+                                        <p:cTn id="14" dur="1" fill="hold">
+                                          <p:stCondLst>
+                                            <p:cond delay="0"/>
+                                          </p:stCondLst>
+                                        </p:cTn>
+                                        <p:tgtEl>
+                                          <p:spTgt spid="6">
+                                            <p:txEl>
+                                              <p:pRg st="4" end="4"/>
+                                            </p:txEl>
+                                          </p:spTgt>
+                                        </p:tgtEl>
+                                        <p:attrNameLst>
+                                          <p:attrName>style.visibility</p:attrName>
+                                        </p:attrNameLst>
+                                      </p:cBhvr>
+                                      <p:to>
+                                        <p:strVal val="visible"/>
+                                      </p:to>
+                                    </p:set>
+                                  </p:childTnLst>
+                                </p:cTn>
+                              </p:par>
+                              <p:par>
+                                <p:cTn id="15" presetID="1" presetClass="entr" presetSubtype="0" fill="hold" nodeType="withEffect">
+                                  <p:stCondLst>
+                                    <p:cond delay="0"/>
+                                  </p:stCondLst>
+                                  <p:childTnLst>
+                                    <p:set>
+                                      <p:cBhvr>
+                                        <p:cTn id="16" dur="1" fill="hold">
+                                          <p:stCondLst>
+                                            <p:cond delay="0"/>
+                                          </p:stCondLst>
+                                        </p:cTn>
+                                        <p:tgtEl>
+                                          <p:spTgt spid="6">
+                                            <p:txEl>
+                                              <p:pRg st="5" end="5"/>
+                                            </p:txEl>
+                                          </p:spTgt>
+                                        </p:tgtEl>
+                                        <p:attrNameLst>
+                                          <p:attrName>style.visibility</p:attrName>
+                                        </p:attrNameLst>
+                                      </p:cBhvr>
+                                      <p:to>
+                                        <p:strVal val="visible"/>
+                                      </p:to>
+                                    </p:set>
+                                  </p:childTnLst>
+                                </p:cTn>
+                              </p:par>
+                              <p:par>
+                                <p:cTn id="17" presetID="1" presetClass="entr" presetSubtype="0" fill="hold" nodeType="withEffect">
+                                  <p:stCondLst>
+                                    <p:cond delay="0"/>
+                                  </p:stCondLst>
+                                  <p:childTnLst>
+                                    <p:set>
+                                      <p:cBhvr>
+                                        <p:cTn id="18" dur="1" fill="hold">
+                                          <p:stCondLst>
+                                            <p:cond delay="0"/>
+                                          </p:stCondLst>
+                                        </p:cTn>
+                                        <p:tgtEl>
+                                          <p:spTgt spid="6">
+                                            <p:txEl>
                                               <p:pRg st="6" end="6"/>
                                             </p:txEl>
                                           </p:spTgt>
@@ -33964,14 +34408,14 @@
                                 </p:cTn>
                               </p:par>
                               <p:par>
-                                <p:cTn id="11" presetID="1" presetClass="entr" presetSubtype="0" fill="hold" nodeType="withEffect">
+                                <p:cTn id="19" presetID="1" presetClass="entr" presetSubtype="0" fill="hold" nodeType="withEffect">
                                   <p:stCondLst>
                                     <p:cond delay="0"/>
                                   </p:stCondLst>
                                   <p:childTnLst>
                                     <p:set>
                                       <p:cBhvr>
-                                        <p:cTn id="12" dur="1" fill="hold">
+                                        <p:cTn id="20" dur="1" fill="hold">
                                           <p:stCondLst>
                                             <p:cond delay="0"/>
                                           </p:stCondLst>
@@ -34001,26 +34445,26 @@
                     </p:cTn>
                   </p:par>
                   <p:par>
-                    <p:cTn id="13" fill="hold">
+                    <p:cTn id="21" fill="hold">
                       <p:stCondLst>
                         <p:cond delay="indefinite"/>
                       </p:stCondLst>
                       <p:childTnLst>
                         <p:par>
-                          <p:cTn id="14" fill="hold">
+                          <p:cTn id="22" fill="hold">
                             <p:stCondLst>
                               <p:cond delay="0"/>
                             </p:stCondLst>
                             <p:childTnLst>
                               <p:par>
-                                <p:cTn id="15" presetID="1" presetClass="entr" presetSubtype="0" fill="hold" grpId="0" nodeType="clickEffect">
+                                <p:cTn id="23" presetID="1" presetClass="entr" presetSubtype="0" fill="hold" grpId="0" nodeType="clickEffect">
                                   <p:stCondLst>
                                     <p:cond delay="0"/>
                                   </p:stCondLst>
                                   <p:childTnLst>
                                     <p:set>
                                       <p:cBhvr>
-                                        <p:cTn id="16" dur="1" fill="hold">
+                                        <p:cTn id="24" dur="1" fill="hold">
                                           <p:stCondLst>
                                             <p:cond delay="0"/>
                                           </p:stCondLst>
@@ -34040,14 +34484,14 @@
                                 </p:cTn>
                               </p:par>
                               <p:par>
-                                <p:cTn id="17" presetID="1" presetClass="entr" presetSubtype="0" fill="hold" grpId="0" nodeType="withEffect">
+                                <p:cTn id="25" presetID="1" presetClass="entr" presetSubtype="0" fill="hold" grpId="0" nodeType="withEffect">
                                   <p:stCondLst>
                                     <p:cond delay="0"/>
                                   </p:stCondLst>
                                   <p:childTnLst>
                                     <p:set>
                                       <p:cBhvr>
-                                        <p:cTn id="18" dur="1" fill="hold">
+                                        <p:cTn id="26" dur="1" fill="hold">
                                           <p:stCondLst>
                                             <p:cond delay="0"/>
                                           </p:stCondLst>
@@ -34689,7 +35133,7 @@
                                         <p:tgtEl>
                                           <p:spTgt spid="3">
                                             <p:txEl>
-                                              <p:pRg st="4" end="4"/>
+                                              <p:pRg st="1" end="1"/>
                                             </p:txEl>
                                           </p:spTgt>
                                         </p:tgtEl>
@@ -34720,7 +35164,7 @@
                                         <p:tgtEl>
                                           <p:spTgt spid="3">
                                             <p:txEl>
-                                              <p:pRg st="5" end="5"/>
+                                              <p:pRg st="2" end="2"/>
                                             </p:txEl>
                                           </p:spTgt>
                                         </p:tgtEl>
@@ -34744,6 +35188,117 @@
                                     <p:set>
                                       <p:cBhvr>
                                         <p:cTn id="10" dur="1" fill="hold">
+                                          <p:stCondLst>
+                                            <p:cond delay="0"/>
+                                          </p:stCondLst>
+                                        </p:cTn>
+                                        <p:tgtEl>
+                                          <p:spTgt spid="3">
+                                            <p:txEl>
+                                              <p:pRg st="3" end="3"/>
+                                            </p:txEl>
+                                          </p:spTgt>
+                                        </p:tgtEl>
+                                        <p:attrNameLst>
+                                          <p:attrName>style.visibility</p:attrName>
+                                        </p:attrNameLst>
+                                      </p:cBhvr>
+                                      <p:to>
+                                        <p:strVal val="visible"/>
+                                      </p:to>
+                                    </p:set>
+                                  </p:childTnLst>
+                                </p:cTn>
+                              </p:par>
+                            </p:childTnLst>
+                          </p:cTn>
+                        </p:par>
+                      </p:childTnLst>
+                    </p:cTn>
+                  </p:par>
+                  <p:par>
+                    <p:cTn id="11" fill="hold">
+                      <p:stCondLst>
+                        <p:cond delay="indefinite"/>
+                      </p:stCondLst>
+                      <p:childTnLst>
+                        <p:par>
+                          <p:cTn id="12" fill="hold">
+                            <p:stCondLst>
+                              <p:cond delay="0"/>
+                            </p:stCondLst>
+                            <p:childTnLst>
+                              <p:par>
+                                <p:cTn id="13" presetID="1" presetClass="entr" presetSubtype="0" fill="hold" nodeType="clickEffect">
+                                  <p:stCondLst>
+                                    <p:cond delay="0"/>
+                                  </p:stCondLst>
+                                  <p:childTnLst>
+                                    <p:set>
+                                      <p:cBhvr>
+                                        <p:cTn id="14" dur="1" fill="hold">
+                                          <p:stCondLst>
+                                            <p:cond delay="0"/>
+                                          </p:stCondLst>
+                                        </p:cTn>
+                                        <p:tgtEl>
+                                          <p:spTgt spid="3">
+                                            <p:txEl>
+                                              <p:pRg st="4" end="4"/>
+                                            </p:txEl>
+                                          </p:spTgt>
+                                        </p:tgtEl>
+                                        <p:attrNameLst>
+                                          <p:attrName>style.visibility</p:attrName>
+                                        </p:attrNameLst>
+                                      </p:cBhvr>
+                                      <p:to>
+                                        <p:strVal val="visible"/>
+                                      </p:to>
+                                    </p:set>
+                                  </p:childTnLst>
+                                </p:cTn>
+                              </p:par>
+                              <p:par>
+                                <p:cTn id="15" presetID="1" presetClass="entr" presetSubtype="0" fill="hold" nodeType="withEffect">
+                                  <p:stCondLst>
+                                    <p:cond delay="0"/>
+                                  </p:stCondLst>
+                                  <p:childTnLst>
+                                    <p:set>
+                                      <p:cBhvr>
+                                        <p:cTn id="16" dur="1" fill="hold">
+                                          <p:stCondLst>
+                                            <p:cond delay="0"/>
+                                          </p:stCondLst>
+                                        </p:cTn>
+                                        <p:tgtEl>
+                                          <p:spTgt spid="3">
+                                            <p:txEl>
+                                              <p:pRg st="5" end="5"/>
+                                            </p:txEl>
+                                          </p:spTgt>
+                                        </p:tgtEl>
+                                        <p:attrNameLst>
+                                          <p:attrName>style.visibility</p:attrName>
+                                        </p:attrNameLst>
+                                      </p:cBhvr>
+                                      <p:to>
+                                        <p:strVal val="visible"/>
+                                      </p:to>
+                                    </p:set>
+                                  </p:childTnLst>
+                                </p:cTn>
+                              </p:par>
+                              <p:par>
+                                <p:cTn id="17" presetID="1" presetClass="entr" presetSubtype="0" fill="hold" nodeType="withEffect">
+                                  <p:stCondLst>
+                                    <p:cond delay="0"/>
+                                  </p:stCondLst>
+                                  <p:childTnLst>
+                                    <p:set>
+                                      <p:cBhvr>
+                                        <p:cTn id="18" dur="1" fill="hold">
                                           <p:stCondLst>
                                             <p:cond delay="0"/>
                                           </p:stCondLst>

</xml_diff>